<commit_message>
Static Detection of Event-based Races in Android Apps
</commit_message>
<xml_diff>
--- a/Presentation/20190405_Rabin.pptx
+++ b/Presentation/20190405_Rabin.pptx
@@ -231,7 +231,7 @@
             <a:fld id="{CB3D2ACE-279A-4319-8204-FE4A3DAF1277}" type="datetimeFigureOut">
               <a:rPr lang="en-US" smtClean="0"/>
               <a:pPr/>
-              <a:t>4/5/19</a:t>
+              <a:t>9/5/19</a:t>
             </a:fld>
             <a:endParaRPr lang="en-US"/>
           </a:p>
@@ -3185,7 +3185,7 @@
             <a:fld id="{B61BEF0D-F0BB-DE4B-95CE-6DB70DBA9567}" type="datetimeFigureOut">
               <a:rPr lang="en-US" smtClean="0"/>
               <a:pPr/>
-              <a:t>4/5/19</a:t>
+              <a:t>9/5/19</a:t>
             </a:fld>
             <a:endParaRPr lang="en-US" dirty="0"/>
           </a:p>
@@ -3366,7 +3366,7 @@
             <a:fld id="{B61BEF0D-F0BB-DE4B-95CE-6DB70DBA9567}" type="datetimeFigureOut">
               <a:rPr lang="en-US" smtClean="0"/>
               <a:pPr/>
-              <a:t>4/5/19</a:t>
+              <a:t>9/5/19</a:t>
             </a:fld>
             <a:endParaRPr lang="en-US" dirty="0"/>
           </a:p>
@@ -3548,7 +3548,7 @@
             <a:fld id="{B61BEF0D-F0BB-DE4B-95CE-6DB70DBA9567}" type="datetimeFigureOut">
               <a:rPr lang="en-US" smtClean="0"/>
               <a:pPr/>
-              <a:t>4/5/19</a:t>
+              <a:t>9/5/19</a:t>
             </a:fld>
             <a:endParaRPr lang="en-US" dirty="0"/>
           </a:p>
@@ -3720,7 +3720,7 @@
             <a:fld id="{B61BEF0D-F0BB-DE4B-95CE-6DB70DBA9567}" type="datetimeFigureOut">
               <a:rPr lang="en-US" smtClean="0"/>
               <a:pPr/>
-              <a:t>4/5/19</a:t>
+              <a:t>9/5/19</a:t>
             </a:fld>
             <a:endParaRPr lang="en-US" dirty="0"/>
           </a:p>
@@ -4035,7 +4035,7 @@
             <a:fld id="{B61BEF0D-F0BB-DE4B-95CE-6DB70DBA9567}" type="datetimeFigureOut">
               <a:rPr lang="en-US" smtClean="0"/>
               <a:pPr/>
-              <a:t>4/5/19</a:t>
+              <a:t>9/5/19</a:t>
             </a:fld>
             <a:endParaRPr lang="en-US" dirty="0"/>
           </a:p>
@@ -4423,7 +4423,7 @@
             <a:fld id="{B61BEF0D-F0BB-DE4B-95CE-6DB70DBA9567}" type="datetimeFigureOut">
               <a:rPr lang="en-US" smtClean="0"/>
               <a:pPr/>
-              <a:t>4/5/19</a:t>
+              <a:t>9/5/19</a:t>
             </a:fld>
             <a:endParaRPr lang="en-US" dirty="0"/>
           </a:p>
@@ -4859,7 +4859,7 @@
             <a:fld id="{B61BEF0D-F0BB-DE4B-95CE-6DB70DBA9567}" type="datetimeFigureOut">
               <a:rPr lang="en-US" smtClean="0"/>
               <a:pPr/>
-              <a:t>4/5/19</a:t>
+              <a:t>9/5/19</a:t>
             </a:fld>
             <a:endParaRPr lang="en-US" dirty="0"/>
           </a:p>
@@ -4979,7 +4979,7 @@
             <a:fld id="{B61BEF0D-F0BB-DE4B-95CE-6DB70DBA9567}" type="datetimeFigureOut">
               <a:rPr lang="en-US" smtClean="0"/>
               <a:pPr/>
-              <a:t>4/5/19</a:t>
+              <a:t>9/5/19</a:t>
             </a:fld>
             <a:endParaRPr lang="en-US" dirty="0"/>
           </a:p>
@@ -5076,7 +5076,7 @@
             <a:fld id="{B61BEF0D-F0BB-DE4B-95CE-6DB70DBA9567}" type="datetimeFigureOut">
               <a:rPr lang="en-US" smtClean="0"/>
               <a:pPr/>
-              <a:t>4/5/19</a:t>
+              <a:t>9/5/19</a:t>
             </a:fld>
             <a:endParaRPr lang="en-US" dirty="0"/>
           </a:p>
@@ -5428,7 +5428,7 @@
             <a:fld id="{B61BEF0D-F0BB-DE4B-95CE-6DB70DBA9567}" type="datetimeFigureOut">
               <a:rPr lang="en-US" smtClean="0"/>
               <a:pPr/>
-              <a:t>4/5/19</a:t>
+              <a:t>9/5/19</a:t>
             </a:fld>
             <a:endParaRPr lang="en-US" dirty="0"/>
           </a:p>
@@ -5855,7 +5855,7 @@
             <a:fld id="{B61BEF0D-F0BB-DE4B-95CE-6DB70DBA9567}" type="datetimeFigureOut">
               <a:rPr lang="en-US" smtClean="0"/>
               <a:pPr/>
-              <a:t>4/5/19</a:t>
+              <a:t>9/5/19</a:t>
             </a:fld>
             <a:endParaRPr lang="en-US" dirty="0"/>
           </a:p>
@@ -6138,7 +6138,7 @@
             <a:fld id="{B61BEF0D-F0BB-DE4B-95CE-6DB70DBA9567}" type="datetimeFigureOut">
               <a:rPr lang="en-US" smtClean="0"/>
               <a:pPr/>
-              <a:t>4/5/19</a:t>
+              <a:t>9/5/19</a:t>
             </a:fld>
             <a:endParaRPr lang="en-US" dirty="0"/>
           </a:p>

</xml_diff>